<commit_message>
Updated ppt w/ my recordings
Click on the Record tab at the top -> click on the slide you want to start recording from -> click on "Record" and "From Current Slide...".
I recommend making separate recordings for each slide.
</commit_message>
<xml_diff>
--- a/Virtual CT Scanner.pptx
+++ b/Virtual CT Scanner.pptx
@@ -5,10 +5,10 @@
     <p:sldMasterId id="2147483648" r:id="rId1"/>
   </p:sldMasterIdLst>
   <p:notesMasterIdLst>
-    <p:notesMasterId r:id="rId20"/>
+    <p:notesMasterId r:id="rId19"/>
   </p:notesMasterIdLst>
   <p:handoutMasterIdLst>
-    <p:handoutMasterId r:id="rId21"/>
+    <p:handoutMasterId r:id="rId20"/>
   </p:handoutMasterIdLst>
   <p:sldIdLst>
     <p:sldId id="261" r:id="rId2"/>
@@ -24,11 +24,10 @@
     <p:sldId id="276" r:id="rId12"/>
     <p:sldId id="277" r:id="rId13"/>
     <p:sldId id="278" r:id="rId14"/>
-    <p:sldId id="284" r:id="rId15"/>
-    <p:sldId id="279" r:id="rId16"/>
-    <p:sldId id="280" r:id="rId17"/>
-    <p:sldId id="281" r:id="rId18"/>
-    <p:sldId id="282" r:id="rId19"/>
+    <p:sldId id="279" r:id="rId15"/>
+    <p:sldId id="280" r:id="rId16"/>
+    <p:sldId id="281" r:id="rId17"/>
+    <p:sldId id="282" r:id="rId18"/>
   </p:sldIdLst>
   <p:sldSz cx="12192000" cy="6858000"/>
   <p:notesSz cx="6858000" cy="9144000"/>
@@ -15187,6 +15186,45 @@
           </a:p>
         </p:txBody>
       </p:sp>
+      <p:pic>
+        <p:nvPicPr>
+          <p:cNvPr id="4" name="Audio 3">
+            <a:hlinkClick r:id="" action="ppaction://media"/>
+            <a:extLst>
+              <a:ext uri="{FF2B5EF4-FFF2-40B4-BE49-F238E27FC236}">
+                <a16:creationId xmlns:a16="http://schemas.microsoft.com/office/drawing/2014/main" id="{1D0DEAE4-2F80-F529-F1AD-E663D756249D}"/>
+              </a:ext>
+            </a:extLst>
+          </p:cNvPr>
+          <p:cNvPicPr>
+            <a:picLocks noChangeAspect="1"/>
+          </p:cNvPicPr>
+          <p:nvPr>
+            <a:audioFile r:link="rId2"/>
+            <p:extLst>
+              <p:ext uri="{DAA4B4D4-6D71-4841-9C94-3DE7FCFB9230}">
+                <p14:media xmlns:p14="http://schemas.microsoft.com/office/powerpoint/2010/main" r:embed="rId1"/>
+              </p:ext>
+            </p:extLst>
+          </p:nvPr>
+        </p:nvPicPr>
+        <p:blipFill>
+          <a:blip r:embed="rId4"/>
+          <a:srcRect l="-200000" t="-90625" r="-200000" b="-90625"/>
+          <a:stretch>
+            <a:fillRect/>
+          </a:stretch>
+        </p:blipFill>
+        <p:spPr>
+          <a:xfrm>
+            <a:off x="9144000" y="5143500"/>
+            <a:ext cx="3048000" cy="1714500"/>
+          </a:xfrm>
+          <a:prstGeom prst="rect">
+            <a:avLst/>
+          </a:prstGeom>
+        </p:spPr>
+      </p:pic>
     </p:spTree>
     <p:extLst>
       <p:ext uri="{BB962C8B-B14F-4D97-AF65-F5344CB8AC3E}">
@@ -15197,18 +15235,105 @@
   <p:clrMapOvr>
     <a:masterClrMapping/>
   </p:clrMapOvr>
-  <mc:AlternateContent xmlns:mc="http://schemas.openxmlformats.org/markup-compatibility/2006" xmlns:p14="http://schemas.microsoft.com/office/powerpoint/2010/main">
-    <mc:Choice Requires="p14">
-      <p:transition spd="med" p14:dur="700">
+  <mc:AlternateContent xmlns:mc="http://schemas.openxmlformats.org/markup-compatibility/2006">
+    <mc:Choice xmlns:p14="http://schemas.microsoft.com/office/powerpoint/2010/main" Requires="p14">
+      <p:transition spd="med" p14:dur="700" advTm="27899">
         <p:fade/>
       </p:transition>
     </mc:Choice>
-    <mc:Fallback xmlns="">
-      <p:transition spd="med">
+    <mc:Fallback>
+      <p:transition spd="med" advTm="27899">
         <p:fade/>
       </p:transition>
     </mc:Fallback>
   </mc:AlternateContent>
+  <p:timing>
+    <p:tnLst>
+      <p:par>
+        <p:cTn id="1" dur="indefinite" restart="never" nodeType="tmRoot">
+          <p:childTnLst>
+            <p:seq concurrent="1" nextAc="seek">
+              <p:cTn id="2" dur="indefinite" nodeType="mainSeq">
+                <p:childTnLst>
+                  <p:par>
+                    <p:cTn id="3" fill="hold">
+                      <p:stCondLst>
+                        <p:cond delay="indefinite"/>
+                        <p:cond evt="onBegin" delay="0">
+                          <p:tn val="2"/>
+                        </p:cond>
+                      </p:stCondLst>
+                      <p:childTnLst>
+                        <p:par>
+                          <p:cTn id="4" fill="hold">
+                            <p:stCondLst>
+                              <p:cond delay="0"/>
+                            </p:stCondLst>
+                            <p:childTnLst>
+                              <p:par>
+                                <p:cTn id="5" presetID="1" presetClass="mediacall" presetSubtype="0" fill="hold" nodeType="afterEffect">
+                                  <p:stCondLst>
+                                    <p:cond delay="0"/>
+                                  </p:stCondLst>
+                                  <p:childTnLst>
+                                    <p:cmd type="call" cmd="playFrom(0.0)">
+                                      <p:cBhvr>
+                                        <p:cTn id="6" dur="1" fill="hold"/>
+                                        <p:tgtEl>
+                                          <p:spTgt spid="4"/>
+                                        </p:tgtEl>
+                                      </p:cBhvr>
+                                    </p:cmd>
+                                  </p:childTnLst>
+                                </p:cTn>
+                              </p:par>
+                            </p:childTnLst>
+                          </p:cTn>
+                        </p:par>
+                      </p:childTnLst>
+                    </p:cTn>
+                  </p:par>
+                </p:childTnLst>
+              </p:cTn>
+              <p:prevCondLst>
+                <p:cond evt="onPrev" delay="0">
+                  <p:tgtEl>
+                    <p:sldTgt/>
+                  </p:tgtEl>
+                </p:cond>
+              </p:prevCondLst>
+              <p:nextCondLst>
+                <p:cond evt="onNext" delay="0">
+                  <p:tgtEl>
+                    <p:sldTgt/>
+                  </p:tgtEl>
+                </p:cond>
+              </p:nextCondLst>
+            </p:seq>
+            <p:audio isNarration="1">
+              <p:cMediaNode vol="80000" showWhenStopped="0">
+                <p:cTn id="7" fill="hold" display="0">
+                  <p:stCondLst>
+                    <p:cond delay="indefinite"/>
+                  </p:stCondLst>
+                  <p:endCondLst>
+                    <p:cond evt="onStopAudio" delay="0">
+                      <p:tgtEl>
+                        <p:sldTgt/>
+                      </p:tgtEl>
+                    </p:cond>
+                  </p:endCondLst>
+                </p:cTn>
+                <p:tgtEl>
+                  <p:spTgt spid="4"/>
+                </p:tgtEl>
+              </p:cMediaNode>
+            </p:audio>
+          </p:childTnLst>
+        </p:cTn>
+      </p:par>
+    </p:tnLst>
+  </p:timing>
 </p:sld>
 </file>
 
@@ -15540,6 +15665,37 @@
           </a:p>
         </p:txBody>
       </p:sp>
+      <p:pic>
+        <p:nvPicPr>
+          <p:cNvPr id="6" name="Picture 5" descr="A screenshot of a computer&#10;&#10;Description automatically generated">
+            <a:extLst>
+              <a:ext uri="{FF2B5EF4-FFF2-40B4-BE49-F238E27FC236}">
+                <a16:creationId xmlns:a16="http://schemas.microsoft.com/office/drawing/2014/main" id="{54546C00-707A-4B3D-8E1B-7625CCD47648}"/>
+              </a:ext>
+            </a:extLst>
+          </p:cNvPr>
+          <p:cNvPicPr>
+            <a:picLocks noChangeAspect="1"/>
+          </p:cNvPicPr>
+          <p:nvPr/>
+        </p:nvPicPr>
+        <p:blipFill>
+          <a:blip r:embed="rId2"/>
+          <a:stretch>
+            <a:fillRect/>
+          </a:stretch>
+        </p:blipFill>
+        <p:spPr>
+          <a:xfrm>
+            <a:off x="1295400" y="1981199"/>
+            <a:ext cx="5029200" cy="3412124"/>
+          </a:xfrm>
+          <a:prstGeom prst="rect">
+            <a:avLst/>
+          </a:prstGeom>
+          <a:noFill/>
+        </p:spPr>
+      </p:pic>
       <p:sp>
         <p:nvSpPr>
           <p:cNvPr id="3" name="Content Placeholder 2"/>
@@ -15686,36 +15842,6 @@
           </a:p>
         </p:txBody>
       </p:sp>
-      <p:pic>
-        <p:nvPicPr>
-          <p:cNvPr id="5" name="Picture 4">
-            <a:extLst>
-              <a:ext uri="{FF2B5EF4-FFF2-40B4-BE49-F238E27FC236}">
-                <a16:creationId xmlns:a16="http://schemas.microsoft.com/office/drawing/2014/main" id="{76B5CA9C-4F5E-4FBE-A5FA-DFE6AFEACA81}"/>
-              </a:ext>
-            </a:extLst>
-          </p:cNvPr>
-          <p:cNvPicPr>
-            <a:picLocks noChangeAspect="1"/>
-          </p:cNvPicPr>
-          <p:nvPr/>
-        </p:nvPicPr>
-        <p:blipFill>
-          <a:blip r:embed="rId2"/>
-          <a:stretch>
-            <a:fillRect/>
-          </a:stretch>
-        </p:blipFill>
-        <p:spPr>
-          <a:xfrm>
-            <a:off x="1036076" y="1634837"/>
-            <a:ext cx="5572541" cy="4156364"/>
-          </a:xfrm>
-          <a:prstGeom prst="rect">
-            <a:avLst/>
-          </a:prstGeom>
-        </p:spPr>
-      </p:pic>
     </p:spTree>
     <p:extLst>
       <p:ext uri="{BB962C8B-B14F-4D97-AF65-F5344CB8AC3E}">
@@ -15770,8 +15896,8 @@
         </p:nvSpPr>
         <p:spPr>
           <a:xfrm>
-            <a:off x="843383" y="503853"/>
-            <a:ext cx="10053217" cy="770765"/>
+            <a:off x="1295400" y="503853"/>
+            <a:ext cx="9601200" cy="770765"/>
           </a:xfrm>
         </p:spPr>
         <p:txBody>
@@ -15782,11 +15908,42 @@
           <a:p>
             <a:r>
               <a:rPr lang="en-US" dirty="0"/>
-              <a:t>Signal Intensity (SI) and Contrast </a:t>
+              <a:t>Image Analysis</a:t>
             </a:r>
           </a:p>
         </p:txBody>
       </p:sp>
+      <p:pic>
+        <p:nvPicPr>
+          <p:cNvPr id="6" name="Picture 5" descr="A screenshot of a computer&#10;&#10;Description automatically generated">
+            <a:extLst>
+              <a:ext uri="{FF2B5EF4-FFF2-40B4-BE49-F238E27FC236}">
+                <a16:creationId xmlns:a16="http://schemas.microsoft.com/office/drawing/2014/main" id="{54546C00-707A-4B3D-8E1B-7625CCD47648}"/>
+              </a:ext>
+            </a:extLst>
+          </p:cNvPr>
+          <p:cNvPicPr>
+            <a:picLocks noChangeAspect="1"/>
+          </p:cNvPicPr>
+          <p:nvPr/>
+        </p:nvPicPr>
+        <p:blipFill>
+          <a:blip r:embed="rId2"/>
+          <a:stretch>
+            <a:fillRect/>
+          </a:stretch>
+        </p:blipFill>
+        <p:spPr>
+          <a:xfrm>
+            <a:off x="1295400" y="1981199"/>
+            <a:ext cx="5029200" cy="3412124"/>
+          </a:xfrm>
+          <a:prstGeom prst="rect">
+            <a:avLst/>
+          </a:prstGeom>
+          <a:noFill/>
+        </p:spPr>
+      </p:pic>
       <p:sp>
         <p:nvSpPr>
           <p:cNvPr id="3" name="Content Placeholder 2"/>
@@ -15840,76 +15997,17 @@
               <a:buChar char="•"/>
             </a:pPr>
             <a:r>
-              <a:rPr lang="en-US" b="0" i="0" dirty="0">
+              <a:rPr lang="en-US" sz="2000" b="0" i="0" dirty="0">
                 <a:solidFill>
                   <a:srgbClr val="111111"/>
                 </a:solidFill>
                 <a:effectLst/>
               </a:rPr>
-              <a:t>After you press SI and Contrast </a:t>
+              <a:t>It compares two random points in the image and output the contrast between them.</a:t>
             </a:r>
-          </a:p>
-          <a:p>
-            <a:pPr lvl="1">
-              <a:buFont typeface="Arial" panose="020B0604020202020204" pitchFamily="34" charset="0"/>
-              <a:buChar char="•"/>
-            </a:pPr>
-            <a:r>
-              <a:rPr lang="en-US" b="0" i="0" dirty="0">
-                <a:solidFill>
-                  <a:srgbClr val="111111"/>
-                </a:solidFill>
-                <a:effectLst/>
-              </a:rPr>
-              <a:t>Pop up window will show</a:t>
-            </a:r>
-            <a:r>
-              <a:rPr lang="en-US" dirty="0">
-                <a:solidFill>
-                  <a:srgbClr val="111111"/>
-                </a:solidFill>
-              </a:rPr>
-              <a:t> where you can select which image you want to analyze for SI and contrast.</a:t>
-            </a:r>
-            <a:endParaRPr lang="en-US" b="0" i="0" dirty="0">
-              <a:solidFill>
-                <a:srgbClr val="111111"/>
-              </a:solidFill>
-              <a:effectLst/>
-            </a:endParaRPr>
           </a:p>
         </p:txBody>
       </p:sp>
-      <p:pic>
-        <p:nvPicPr>
-          <p:cNvPr id="5" name="Picture 4">
-            <a:extLst>
-              <a:ext uri="{FF2B5EF4-FFF2-40B4-BE49-F238E27FC236}">
-                <a16:creationId xmlns:a16="http://schemas.microsoft.com/office/drawing/2014/main" id="{639AB375-4E78-4901-8291-9CAFA25DCADD}"/>
-              </a:ext>
-            </a:extLst>
-          </p:cNvPr>
-          <p:cNvPicPr>
-            <a:picLocks noChangeAspect="1"/>
-          </p:cNvPicPr>
-          <p:nvPr/>
-        </p:nvPicPr>
-        <p:blipFill>
-          <a:blip r:embed="rId2"/>
-          <a:stretch>
-            <a:fillRect/>
-          </a:stretch>
-        </p:blipFill>
-        <p:spPr>
-          <a:xfrm>
-            <a:off x="843383" y="1561839"/>
-            <a:ext cx="5525271" cy="3734321"/>
-          </a:xfrm>
-          <a:prstGeom prst="rect">
-            <a:avLst/>
-          </a:prstGeom>
-        </p:spPr>
-      </p:pic>
     </p:spTree>
     <p:extLst>
       <p:ext uri="{BB962C8B-B14F-4D97-AF65-F5344CB8AC3E}">
@@ -15954,13 +16052,7 @@
       </p:grpSpPr>
       <p:sp>
         <p:nvSpPr>
-          <p:cNvPr id="2" name="Title 1">
-            <a:extLst>
-              <a:ext uri="{FF2B5EF4-FFF2-40B4-BE49-F238E27FC236}">
-                <a16:creationId xmlns:a16="http://schemas.microsoft.com/office/drawing/2014/main" id="{C712203C-281E-4914-82A8-E611AD546D26}"/>
-              </a:ext>
-            </a:extLst>
-          </p:cNvPr>
+          <p:cNvPr id="2" name="Title 1"/>
           <p:cNvSpPr>
             <a:spLocks noGrp="1"/>
           </p:cNvSpPr>
@@ -15970,73 +16062,36 @@
         </p:nvSpPr>
         <p:spPr>
           <a:xfrm>
-            <a:off x="1295400" y="304801"/>
-            <a:ext cx="9601200" cy="641350"/>
+            <a:off x="1295400" y="503853"/>
+            <a:ext cx="9601200" cy="1142385"/>
           </a:xfrm>
         </p:spPr>
         <p:txBody>
-          <a:bodyPr/>
+          <a:bodyPr anchor="b">
+            <a:normAutofit/>
+          </a:bodyPr>
           <a:lstStyle/>
           <a:p>
             <a:r>
               <a:rPr lang="en-US" dirty="0"/>
-              <a:t>Signal Intensity (SI) and Contrast </a:t>
-            </a:r>
-          </a:p>
-        </p:txBody>
-      </p:sp>
-      <p:sp>
-        <p:nvSpPr>
-          <p:cNvPr id="3" name="Text Placeholder 2">
-            <a:extLst>
-              <a:ext uri="{FF2B5EF4-FFF2-40B4-BE49-F238E27FC236}">
-                <a16:creationId xmlns:a16="http://schemas.microsoft.com/office/drawing/2014/main" id="{2E662918-904A-46FA-BFC4-D6DB54FAC4D7}"/>
-              </a:ext>
-            </a:extLst>
-          </p:cNvPr>
-          <p:cNvSpPr>
-            <a:spLocks noGrp="1"/>
-          </p:cNvSpPr>
-          <p:nvPr>
-            <p:ph type="body" idx="1"/>
-          </p:nvPr>
-        </p:nvSpPr>
-        <p:spPr>
-          <a:xfrm>
-            <a:off x="1295400" y="1330036"/>
-            <a:ext cx="4572000" cy="641350"/>
-          </a:xfrm>
-        </p:spPr>
-        <p:txBody>
-          <a:bodyPr/>
-          <a:lstStyle/>
-          <a:p>
-            <a:r>
-              <a:rPr lang="en-US" dirty="0">
-                <a:solidFill>
-                  <a:schemeClr val="tx1"/>
-                </a:solidFill>
-              </a:rPr>
-              <a:t>New window will pop up and you can select two point on the image</a:t>
+              <a:t>Image Analysis</a:t>
             </a:r>
           </a:p>
         </p:txBody>
       </p:sp>
       <p:pic>
         <p:nvPicPr>
-          <p:cNvPr id="8" name="Content Placeholder 7">
+          <p:cNvPr id="5" name="Picture 4" descr="A screenshot of a computer&#10;&#10;Description automatically generated">
             <a:extLst>
               <a:ext uri="{FF2B5EF4-FFF2-40B4-BE49-F238E27FC236}">
-                <a16:creationId xmlns:a16="http://schemas.microsoft.com/office/drawing/2014/main" id="{A149D380-F2D7-4992-B7C8-2A1924501439}"/>
+                <a16:creationId xmlns:a16="http://schemas.microsoft.com/office/drawing/2014/main" id="{FA99A541-0CE3-4242-85BC-FD0116E70BBB}"/>
               </a:ext>
             </a:extLst>
           </p:cNvPr>
           <p:cNvPicPr>
-            <a:picLocks noGrp="1" noChangeAspect="1"/>
+            <a:picLocks noChangeAspect="1"/>
           </p:cNvPicPr>
-          <p:nvPr>
-            <p:ph sz="half" idx="2"/>
-          </p:nvPr>
+          <p:nvPr/>
         </p:nvPicPr>
         <p:blipFill>
           <a:blip r:embed="rId2"/>
@@ -16046,81 +16101,103 @@
         </p:blipFill>
         <p:spPr>
           <a:xfrm>
-            <a:off x="1295400" y="2155825"/>
-            <a:ext cx="4572000" cy="3879215"/>
+            <a:off x="1295400" y="2171699"/>
+            <a:ext cx="4572000" cy="3429000"/>
           </a:xfrm>
+          <a:prstGeom prst="rect">
+            <a:avLst/>
+          </a:prstGeom>
+          <a:noFill/>
         </p:spPr>
       </p:pic>
       <p:sp>
         <p:nvSpPr>
-          <p:cNvPr id="5" name="Text Placeholder 4">
-            <a:extLst>
-              <a:ext uri="{FF2B5EF4-FFF2-40B4-BE49-F238E27FC236}">
-                <a16:creationId xmlns:a16="http://schemas.microsoft.com/office/drawing/2014/main" id="{B338B478-62D4-4138-A9C6-1B90A826CFB5}"/>
-              </a:ext>
-            </a:extLst>
-          </p:cNvPr>
+          <p:cNvPr id="3" name="Content Placeholder 2"/>
           <p:cNvSpPr>
             <a:spLocks noGrp="1"/>
           </p:cNvSpPr>
           <p:nvPr>
-            <p:ph type="body" sz="quarter" idx="3"/>
+            <p:ph sz="half" idx="2"/>
           </p:nvPr>
         </p:nvSpPr>
         <p:spPr>
           <a:xfrm>
-            <a:off x="6324600" y="1330036"/>
-            <a:ext cx="4572000" cy="641351"/>
+            <a:off x="6324600" y="1981199"/>
+            <a:ext cx="4572000" cy="3810001"/>
           </a:xfrm>
         </p:spPr>
         <p:txBody>
-          <a:bodyPr/>
+          <a:bodyPr>
+            <a:normAutofit/>
+          </a:bodyPr>
           <a:lstStyle/>
           <a:p>
+            <a:pPr algn="l">
+              <a:buFont typeface="Arial" panose="020B0604020202020204" pitchFamily="34" charset="0"/>
+              <a:buChar char="•"/>
+            </a:pPr>
             <a:r>
-              <a:rPr lang="en-US" dirty="0">
-                <a:solidFill>
-                  <a:schemeClr val="tx1"/>
-                </a:solidFill>
+              <a:rPr lang="en-US" b="1" i="0" dirty="0">
+                <a:solidFill>
+                  <a:schemeClr val="accent1">
+                    <a:lumMod val="75000"/>
+                  </a:schemeClr>
+                </a:solidFill>
+                <a:effectLst/>
               </a:rPr>
-              <a:t>It will show the contrast between those two points in a new window.</a:t>
+              <a:t>Image Difference</a:t>
             </a:r>
+            <a:r>
+              <a:rPr lang="en-US" b="0" i="0" dirty="0">
+                <a:solidFill>
+                  <a:schemeClr val="accent1">
+                    <a:lumMod val="75000"/>
+                  </a:schemeClr>
+                </a:solidFill>
+                <a:effectLst/>
+              </a:rPr>
+              <a:t>: </a:t>
+            </a:r>
+            <a:r>
+              <a:rPr lang="en-US" b="0" i="0" dirty="0">
+                <a:solidFill>
+                  <a:srgbClr val="111111"/>
+                </a:solidFill>
+                <a:effectLst/>
+              </a:rPr>
+              <a:t>Enables users to compare the reconstructed image generated by the scanner controls  with the original input (phantom).</a:t>
+            </a:r>
+          </a:p>
+          <a:p>
+            <a:pPr lvl="1">
+              <a:buFont typeface="Arial" panose="020B0604020202020204" pitchFamily="34" charset="0"/>
+              <a:buChar char="•"/>
+            </a:pPr>
+            <a:endParaRPr lang="en-US" b="0" i="0" dirty="0">
+              <a:solidFill>
+                <a:srgbClr val="111111"/>
+              </a:solidFill>
+              <a:effectLst/>
+            </a:endParaRPr>
+          </a:p>
+          <a:p>
+            <a:pPr algn="l">
+              <a:buFont typeface="Arial" panose="020B0604020202020204" pitchFamily="34" charset="0"/>
+              <a:buChar char="•"/>
+            </a:pPr>
+            <a:endParaRPr lang="en-US" b="0" i="0" dirty="0">
+              <a:solidFill>
+                <a:srgbClr val="111111"/>
+              </a:solidFill>
+              <a:effectLst/>
+            </a:endParaRPr>
           </a:p>
         </p:txBody>
       </p:sp>
-      <p:pic>
-        <p:nvPicPr>
-          <p:cNvPr id="12" name="Content Placeholder 11">
-            <a:extLst>
-              <a:ext uri="{FF2B5EF4-FFF2-40B4-BE49-F238E27FC236}">
-                <a16:creationId xmlns:a16="http://schemas.microsoft.com/office/drawing/2014/main" id="{397FE797-016A-4EDF-9716-F8FF7BA689F2}"/>
-              </a:ext>
-            </a:extLst>
-          </p:cNvPr>
-          <p:cNvPicPr>
-            <a:picLocks noGrp="1" noChangeAspect="1"/>
-          </p:cNvPicPr>
-          <p:nvPr>
-            <p:ph sz="quarter" idx="4"/>
-          </p:nvPr>
-        </p:nvPicPr>
-        <p:blipFill>
-          <a:blip r:embed="rId3"/>
-          <a:stretch>
-            <a:fillRect/>
-          </a:stretch>
-        </p:blipFill>
-        <p:spPr>
-          <a:xfrm>
-            <a:off x="6324599" y="2155826"/>
-            <a:ext cx="4717473" cy="3879214"/>
-          </a:xfrm>
-        </p:spPr>
-      </p:pic>
     </p:spTree>
     <p:extLst>
       <p:ext uri="{BB962C8B-B14F-4D97-AF65-F5344CB8AC3E}">
-        <p14:creationId xmlns:p14="http://schemas.microsoft.com/office/powerpoint/2010/main" val="1957851957"/>
+        <p14:creationId xmlns:p14="http://schemas.microsoft.com/office/powerpoint/2010/main" val="1131408258"/>
       </p:ext>
     </p:extLst>
   </p:cSld>
@@ -16183,192 +16260,7 @@
           <a:p>
             <a:r>
               <a:rPr lang="en-US" dirty="0"/>
-              <a:t>Image Difference</a:t>
-            </a:r>
-          </a:p>
-        </p:txBody>
-      </p:sp>
-      <p:sp>
-        <p:nvSpPr>
-          <p:cNvPr id="3" name="Content Placeholder 2"/>
-          <p:cNvSpPr>
-            <a:spLocks noGrp="1"/>
-          </p:cNvSpPr>
-          <p:nvPr>
-            <p:ph sz="half" idx="2"/>
-          </p:nvPr>
-        </p:nvSpPr>
-        <p:spPr>
-          <a:xfrm>
-            <a:off x="6324600" y="1981199"/>
-            <a:ext cx="4572000" cy="3810001"/>
-          </a:xfrm>
-        </p:spPr>
-        <p:txBody>
-          <a:bodyPr>
-            <a:normAutofit/>
-          </a:bodyPr>
-          <a:lstStyle/>
-          <a:p>
-            <a:pPr algn="l">
-              <a:buFont typeface="Arial" panose="020B0604020202020204" pitchFamily="34" charset="0"/>
-              <a:buChar char="•"/>
-            </a:pPr>
-            <a:r>
-              <a:rPr lang="en-US" b="1" i="0" dirty="0">
-                <a:solidFill>
-                  <a:schemeClr val="accent1">
-                    <a:lumMod val="75000"/>
-                  </a:schemeClr>
-                </a:solidFill>
-                <a:effectLst/>
-              </a:rPr>
-              <a:t>Image Difference</a:t>
-            </a:r>
-            <a:r>
-              <a:rPr lang="en-US" b="0" i="0" dirty="0">
-                <a:solidFill>
-                  <a:schemeClr val="accent1">
-                    <a:lumMod val="75000"/>
-                  </a:schemeClr>
-                </a:solidFill>
-                <a:effectLst/>
-              </a:rPr>
-              <a:t>: </a:t>
-            </a:r>
-            <a:r>
-              <a:rPr lang="en-US" b="0" i="0" dirty="0">
-                <a:solidFill>
-                  <a:srgbClr val="111111"/>
-                </a:solidFill>
-                <a:effectLst/>
-              </a:rPr>
-              <a:t>Enables users to compare the reconstructed image generated by the scanner controls  with the original input (phantom).</a:t>
-            </a:r>
-          </a:p>
-          <a:p>
-            <a:pPr lvl="1">
-              <a:buFont typeface="Arial" panose="020B0604020202020204" pitchFamily="34" charset="0"/>
-              <a:buChar char="•"/>
-            </a:pPr>
-            <a:endParaRPr lang="en-US" b="0" i="0" dirty="0">
-              <a:solidFill>
-                <a:srgbClr val="111111"/>
-              </a:solidFill>
-              <a:effectLst/>
-            </a:endParaRPr>
-          </a:p>
-          <a:p>
-            <a:pPr algn="l">
-              <a:buFont typeface="Arial" panose="020B0604020202020204" pitchFamily="34" charset="0"/>
-              <a:buChar char="•"/>
-            </a:pPr>
-            <a:endParaRPr lang="en-US" b="0" i="0" dirty="0">
-              <a:solidFill>
-                <a:srgbClr val="111111"/>
-              </a:solidFill>
-              <a:effectLst/>
-            </a:endParaRPr>
-          </a:p>
-        </p:txBody>
-      </p:sp>
-      <p:pic>
-        <p:nvPicPr>
-          <p:cNvPr id="6" name="Picture 5">
-            <a:extLst>
-              <a:ext uri="{FF2B5EF4-FFF2-40B4-BE49-F238E27FC236}">
-                <a16:creationId xmlns:a16="http://schemas.microsoft.com/office/drawing/2014/main" id="{B2BC11AC-55AA-40B8-A1AF-D957FA171D26}"/>
-              </a:ext>
-            </a:extLst>
-          </p:cNvPr>
-          <p:cNvPicPr>
-            <a:picLocks noChangeAspect="1"/>
-          </p:cNvPicPr>
-          <p:nvPr/>
-        </p:nvPicPr>
-        <p:blipFill>
-          <a:blip r:embed="rId2"/>
-          <a:stretch>
-            <a:fillRect/>
-          </a:stretch>
-        </p:blipFill>
-        <p:spPr>
-          <a:xfrm>
-            <a:off x="1090986" y="1890530"/>
-            <a:ext cx="5005013" cy="3900670"/>
-          </a:xfrm>
-          <a:prstGeom prst="rect">
-            <a:avLst/>
-          </a:prstGeom>
-        </p:spPr>
-      </p:pic>
-    </p:spTree>
-    <p:extLst>
-      <p:ext uri="{BB962C8B-B14F-4D97-AF65-F5344CB8AC3E}">
-        <p14:creationId xmlns:p14="http://schemas.microsoft.com/office/powerpoint/2010/main" val="1131408258"/>
-      </p:ext>
-    </p:extLst>
-  </p:cSld>
-  <p:clrMapOvr>
-    <a:masterClrMapping/>
-  </p:clrMapOvr>
-  <mc:AlternateContent xmlns:mc="http://schemas.openxmlformats.org/markup-compatibility/2006" xmlns:p14="http://schemas.microsoft.com/office/powerpoint/2010/main">
-    <mc:Choice Requires="p14">
-      <p:transition spd="med" p14:dur="700">
-        <p:fade/>
-      </p:transition>
-    </mc:Choice>
-    <mc:Fallback xmlns="">
-      <p:transition spd="med">
-        <p:fade/>
-      </p:transition>
-    </mc:Fallback>
-  </mc:AlternateContent>
-</p:sld>
-</file>
-
-<file path=ppt/slides/slide16.xml><?xml version="1.0" encoding="utf-8"?>
-<p:sld xmlns:a="http://schemas.openxmlformats.org/drawingml/2006/main" xmlns:r="http://schemas.openxmlformats.org/officeDocument/2006/relationships" xmlns:p="http://schemas.openxmlformats.org/presentationml/2006/main">
-  <p:cSld>
-    <p:spTree>
-      <p:nvGrpSpPr>
-        <p:cNvPr id="1" name=""/>
-        <p:cNvGrpSpPr/>
-        <p:nvPr/>
-      </p:nvGrpSpPr>
-      <p:grpSpPr>
-        <a:xfrm>
-          <a:off x="0" y="0"/>
-          <a:ext cx="0" cy="0"/>
-          <a:chOff x="0" y="0"/>
-          <a:chExt cx="0" cy="0"/>
-        </a:xfrm>
-      </p:grpSpPr>
-      <p:sp>
-        <p:nvSpPr>
-          <p:cNvPr id="2" name="Title 1"/>
-          <p:cNvSpPr>
-            <a:spLocks noGrp="1"/>
-          </p:cNvSpPr>
-          <p:nvPr>
-            <p:ph type="title"/>
-          </p:nvPr>
-        </p:nvSpPr>
-        <p:spPr>
-          <a:xfrm>
-            <a:off x="1295400" y="503853"/>
-            <a:ext cx="9601200" cy="1142385"/>
-          </a:xfrm>
-        </p:spPr>
-        <p:txBody>
-          <a:bodyPr anchor="b">
-            <a:normAutofit/>
-          </a:bodyPr>
-          <a:lstStyle/>
-          <a:p>
-            <a:r>
-              <a:rPr lang="en-US" dirty="0"/>
-              <a:t>SI Profiles</a:t>
+              <a:t>Image Analysis</a:t>
             </a:r>
           </a:p>
         </p:txBody>
@@ -16532,7 +16424,7 @@
 </p:sld>
 </file>
 
-<file path=ppt/slides/slide17.xml><?xml version="1.0" encoding="utf-8"?>
+<file path=ppt/slides/slide16.xml><?xml version="1.0" encoding="utf-8"?>
 <p:sld xmlns:a="http://schemas.openxmlformats.org/drawingml/2006/main" xmlns:r="http://schemas.openxmlformats.org/officeDocument/2006/relationships" xmlns:p="http://schemas.openxmlformats.org/presentationml/2006/main">
   <p:cSld>
     <p:spTree>
@@ -16573,7 +16465,7 @@
           <a:p>
             <a:r>
               <a:rPr lang="en-US" dirty="0"/>
-              <a:t>SI Profiles</a:t>
+              <a:t>Image Analysis</a:t>
             </a:r>
           </a:p>
         </p:txBody>
@@ -16685,7 +16577,7 @@
 </p:sld>
 </file>
 
-<file path=ppt/slides/slide18.xml><?xml version="1.0" encoding="utf-8"?>
+<file path=ppt/slides/slide17.xml><?xml version="1.0" encoding="utf-8"?>
 <p:sld xmlns:a="http://schemas.openxmlformats.org/drawingml/2006/main" xmlns:r="http://schemas.openxmlformats.org/officeDocument/2006/relationships" xmlns:p="http://schemas.openxmlformats.org/presentationml/2006/main">
   <p:cSld>
     <p:spTree>
@@ -16726,7 +16618,7 @@
           <a:p>
             <a:r>
               <a:rPr lang="en-US" dirty="0"/>
-              <a:t>SI Profiles</a:t>
+              <a:t>Image Analysis</a:t>
             </a:r>
           </a:p>
         </p:txBody>
@@ -17120,13 +17012,25 @@
           <a:p>
             <a:r>
               <a:rPr lang="en-US" sz="2400" dirty="0"/>
-              <a:t>Phantom Generation </a:t>
+              <a:t>Test/Validation Phantoms Generation</a:t>
             </a:r>
           </a:p>
           <a:p>
             <a:r>
               <a:rPr lang="en-US" sz="2400" dirty="0"/>
-              <a:t>Scanner Controls &amp; Reconstructed Image</a:t>
+              <a:t>Scanner Controls &amp; Image Reconstruction</a:t>
+            </a:r>
+          </a:p>
+          <a:p>
+            <a:r>
+              <a:rPr lang="en-US" sz="2400" dirty="0"/>
+              <a:t>Operation of the Scanner</a:t>
+            </a:r>
+          </a:p>
+          <a:p>
+            <a:r>
+              <a:rPr lang="en-US" sz="2400" dirty="0"/>
+              <a:t>Graphical User Interface</a:t>
             </a:r>
           </a:p>
           <a:p>
@@ -17141,6 +17045,45 @@
           </a:p>
         </p:txBody>
       </p:sp>
+      <p:pic>
+        <p:nvPicPr>
+          <p:cNvPr id="4" name="Audio 3">
+            <a:hlinkClick r:id="" action="ppaction://media"/>
+            <a:extLst>
+              <a:ext uri="{FF2B5EF4-FFF2-40B4-BE49-F238E27FC236}">
+                <a16:creationId xmlns:a16="http://schemas.microsoft.com/office/drawing/2014/main" id="{C32950B1-4A1F-BE1F-2E83-2B821644A8FB}"/>
+              </a:ext>
+            </a:extLst>
+          </p:cNvPr>
+          <p:cNvPicPr>
+            <a:picLocks noChangeAspect="1"/>
+          </p:cNvPicPr>
+          <p:nvPr>
+            <a:audioFile r:link="rId2"/>
+            <p:extLst>
+              <p:ext uri="{DAA4B4D4-6D71-4841-9C94-3DE7FCFB9230}">
+                <p14:media xmlns:p14="http://schemas.microsoft.com/office/powerpoint/2010/main" r:embed="rId1"/>
+              </p:ext>
+            </p:extLst>
+          </p:nvPr>
+        </p:nvPicPr>
+        <p:blipFill>
+          <a:blip r:embed="rId5"/>
+          <a:srcRect l="-200000" t="-90625" r="-200000" b="-90625"/>
+          <a:stretch>
+            <a:fillRect/>
+          </a:stretch>
+        </p:blipFill>
+        <p:spPr>
+          <a:xfrm>
+            <a:off x="9144000" y="5143500"/>
+            <a:ext cx="3048000" cy="1714500"/>
+          </a:xfrm>
+          <a:prstGeom prst="rect">
+            <a:avLst/>
+          </a:prstGeom>
+        </p:spPr>
+      </p:pic>
     </p:spTree>
     <p:extLst>
       <p:ext uri="{BB962C8B-B14F-4D97-AF65-F5344CB8AC3E}">
@@ -17151,18 +17094,105 @@
   <p:clrMapOvr>
     <a:masterClrMapping/>
   </p:clrMapOvr>
-  <mc:AlternateContent xmlns:mc="http://schemas.openxmlformats.org/markup-compatibility/2006" xmlns:p14="http://schemas.microsoft.com/office/powerpoint/2010/main">
-    <mc:Choice Requires="p14">
-      <p:transition spd="med" p14:dur="700">
+  <mc:AlternateContent xmlns:mc="http://schemas.openxmlformats.org/markup-compatibility/2006">
+    <mc:Choice xmlns:p14="http://schemas.microsoft.com/office/powerpoint/2010/main" Requires="p14">
+      <p:transition spd="med" p14:dur="700" advTm="13997">
         <p:fade/>
       </p:transition>
     </mc:Choice>
-    <mc:Fallback xmlns="">
-      <p:transition spd="med">
+    <mc:Fallback>
+      <p:transition spd="med" advTm="13997">
         <p:fade/>
       </p:transition>
     </mc:Fallback>
   </mc:AlternateContent>
+  <p:timing>
+    <p:tnLst>
+      <p:par>
+        <p:cTn id="1" dur="indefinite" restart="never" nodeType="tmRoot">
+          <p:childTnLst>
+            <p:seq concurrent="1" nextAc="seek">
+              <p:cTn id="2" dur="indefinite" nodeType="mainSeq">
+                <p:childTnLst>
+                  <p:par>
+                    <p:cTn id="3" fill="hold">
+                      <p:stCondLst>
+                        <p:cond delay="indefinite"/>
+                        <p:cond evt="onBegin" delay="0">
+                          <p:tn val="2"/>
+                        </p:cond>
+                      </p:stCondLst>
+                      <p:childTnLst>
+                        <p:par>
+                          <p:cTn id="4" fill="hold">
+                            <p:stCondLst>
+                              <p:cond delay="0"/>
+                            </p:stCondLst>
+                            <p:childTnLst>
+                              <p:par>
+                                <p:cTn id="5" presetID="1" presetClass="mediacall" presetSubtype="0" fill="hold" nodeType="afterEffect">
+                                  <p:stCondLst>
+                                    <p:cond delay="0"/>
+                                  </p:stCondLst>
+                                  <p:childTnLst>
+                                    <p:cmd type="call" cmd="playFrom(0.0)">
+                                      <p:cBhvr>
+                                        <p:cTn id="6" dur="1" fill="hold"/>
+                                        <p:tgtEl>
+                                          <p:spTgt spid="4"/>
+                                        </p:tgtEl>
+                                      </p:cBhvr>
+                                    </p:cmd>
+                                  </p:childTnLst>
+                                </p:cTn>
+                              </p:par>
+                            </p:childTnLst>
+                          </p:cTn>
+                        </p:par>
+                      </p:childTnLst>
+                    </p:cTn>
+                  </p:par>
+                </p:childTnLst>
+              </p:cTn>
+              <p:prevCondLst>
+                <p:cond evt="onPrev" delay="0">
+                  <p:tgtEl>
+                    <p:sldTgt/>
+                  </p:tgtEl>
+                </p:cond>
+              </p:prevCondLst>
+              <p:nextCondLst>
+                <p:cond evt="onNext" delay="0">
+                  <p:tgtEl>
+                    <p:sldTgt/>
+                  </p:tgtEl>
+                </p:cond>
+              </p:nextCondLst>
+            </p:seq>
+            <p:audio isNarration="1">
+              <p:cMediaNode vol="80000" showWhenStopped="0">
+                <p:cTn id="7" fill="hold" display="0">
+                  <p:stCondLst>
+                    <p:cond delay="indefinite"/>
+                  </p:stCondLst>
+                  <p:endCondLst>
+                    <p:cond evt="onStopAudio" delay="0">
+                      <p:tgtEl>
+                        <p:sldTgt/>
+                      </p:tgtEl>
+                    </p:cond>
+                  </p:endCondLst>
+                </p:cTn>
+                <p:tgtEl>
+                  <p:spTgt spid="4"/>
+                </p:tgtEl>
+              </p:cMediaNode>
+            </p:audio>
+          </p:childTnLst>
+        </p:cTn>
+      </p:par>
+    </p:tnLst>
+  </p:timing>
 </p:sld>
 </file>
 
@@ -17205,25 +17235,45 @@
           </a:p>
         </p:txBody>
       </p:sp>
-      <p:sp>
-        <p:nvSpPr>
-          <p:cNvPr id="3" name="Text Placeholder 2"/>
-          <p:cNvSpPr>
-            <a:spLocks noGrp="1"/>
-          </p:cNvSpPr>
+      <p:pic>
+        <p:nvPicPr>
+          <p:cNvPr id="5" name="Audio 4">
+            <a:hlinkClick r:id="" action="ppaction://media"/>
+            <a:extLst>
+              <a:ext uri="{FF2B5EF4-FFF2-40B4-BE49-F238E27FC236}">
+                <a16:creationId xmlns:a16="http://schemas.microsoft.com/office/drawing/2014/main" id="{1E3E6DC9-91BD-31FE-074E-23E4028C08D5}"/>
+              </a:ext>
+            </a:extLst>
+          </p:cNvPr>
+          <p:cNvPicPr>
+            <a:picLocks noChangeAspect="1"/>
+          </p:cNvPicPr>
           <p:nvPr>
-            <p:ph type="body" idx="1"/>
+            <a:audioFile r:link="rId2"/>
+            <p:extLst>
+              <p:ext uri="{DAA4B4D4-6D71-4841-9C94-3DE7FCFB9230}">
+                <p14:media xmlns:p14="http://schemas.microsoft.com/office/powerpoint/2010/main" r:embed="rId1"/>
+              </p:ext>
+            </p:extLst>
           </p:nvPr>
-        </p:nvSpPr>
-        <p:spPr/>
-        <p:txBody>
-          <a:bodyPr/>
-          <a:lstStyle/>
-          <a:p>
-            <a:endParaRPr lang="en-US" dirty="0"/>
-          </a:p>
-        </p:txBody>
-      </p:sp>
+        </p:nvPicPr>
+        <p:blipFill>
+          <a:blip r:embed="rId4"/>
+          <a:srcRect l="-200000" t="-90625" r="-200000" b="-90625"/>
+          <a:stretch>
+            <a:fillRect/>
+          </a:stretch>
+        </p:blipFill>
+        <p:spPr>
+          <a:xfrm>
+            <a:off x="9144000" y="5143500"/>
+            <a:ext cx="3048000" cy="1714500"/>
+          </a:xfrm>
+          <a:prstGeom prst="rect">
+            <a:avLst/>
+          </a:prstGeom>
+        </p:spPr>
+      </p:pic>
     </p:spTree>
     <p:extLst>
       <p:ext uri="{BB962C8B-B14F-4D97-AF65-F5344CB8AC3E}">
@@ -17234,18 +17284,105 @@
   <p:clrMapOvr>
     <a:masterClrMapping/>
   </p:clrMapOvr>
-  <mc:AlternateContent xmlns:mc="http://schemas.openxmlformats.org/markup-compatibility/2006" xmlns:p14="http://schemas.microsoft.com/office/powerpoint/2010/main">
-    <mc:Choice Requires="p14">
-      <p:transition spd="med" p14:dur="700">
+  <mc:AlternateContent xmlns:mc="http://schemas.openxmlformats.org/markup-compatibility/2006">
+    <mc:Choice xmlns:p14="http://schemas.microsoft.com/office/powerpoint/2010/main" Requires="p14">
+      <p:transition spd="med" p14:dur="700" advTm="17333">
         <p:fade/>
       </p:transition>
     </mc:Choice>
-    <mc:Fallback xmlns="">
-      <p:transition spd="med">
+    <mc:Fallback>
+      <p:transition spd="med" advTm="17333">
         <p:fade/>
       </p:transition>
     </mc:Fallback>
   </mc:AlternateContent>
+  <p:timing>
+    <p:tnLst>
+      <p:par>
+        <p:cTn id="1" dur="indefinite" restart="never" nodeType="tmRoot">
+          <p:childTnLst>
+            <p:seq concurrent="1" nextAc="seek">
+              <p:cTn id="2" dur="indefinite" nodeType="mainSeq">
+                <p:childTnLst>
+                  <p:par>
+                    <p:cTn id="3" fill="hold">
+                      <p:stCondLst>
+                        <p:cond delay="indefinite"/>
+                        <p:cond evt="onBegin" delay="0">
+                          <p:tn val="2"/>
+                        </p:cond>
+                      </p:stCondLst>
+                      <p:childTnLst>
+                        <p:par>
+                          <p:cTn id="4" fill="hold">
+                            <p:stCondLst>
+                              <p:cond delay="0"/>
+                            </p:stCondLst>
+                            <p:childTnLst>
+                              <p:par>
+                                <p:cTn id="5" presetID="1" presetClass="mediacall" presetSubtype="0" fill="hold" nodeType="afterEffect">
+                                  <p:stCondLst>
+                                    <p:cond delay="0"/>
+                                  </p:stCondLst>
+                                  <p:childTnLst>
+                                    <p:cmd type="call" cmd="playFrom(0.0)">
+                                      <p:cBhvr>
+                                        <p:cTn id="6" dur="1" fill="hold"/>
+                                        <p:tgtEl>
+                                          <p:spTgt spid="5"/>
+                                        </p:tgtEl>
+                                      </p:cBhvr>
+                                    </p:cmd>
+                                  </p:childTnLst>
+                                </p:cTn>
+                              </p:par>
+                            </p:childTnLst>
+                          </p:cTn>
+                        </p:par>
+                      </p:childTnLst>
+                    </p:cTn>
+                  </p:par>
+                </p:childTnLst>
+              </p:cTn>
+              <p:prevCondLst>
+                <p:cond evt="onPrev" delay="0">
+                  <p:tgtEl>
+                    <p:sldTgt/>
+                  </p:tgtEl>
+                </p:cond>
+              </p:prevCondLst>
+              <p:nextCondLst>
+                <p:cond evt="onNext" delay="0">
+                  <p:tgtEl>
+                    <p:sldTgt/>
+                  </p:tgtEl>
+                </p:cond>
+              </p:nextCondLst>
+            </p:seq>
+            <p:audio isNarration="1">
+              <p:cMediaNode vol="80000" showWhenStopped="0">
+                <p:cTn id="7" fill="hold" display="0">
+                  <p:stCondLst>
+                    <p:cond delay="indefinite"/>
+                  </p:stCondLst>
+                  <p:endCondLst>
+                    <p:cond evt="onStopAudio" delay="0">
+                      <p:tgtEl>
+                        <p:sldTgt/>
+                      </p:tgtEl>
+                    </p:cond>
+                  </p:endCondLst>
+                </p:cTn>
+                <p:tgtEl>
+                  <p:spTgt spid="5"/>
+                </p:tgtEl>
+              </p:cMediaNode>
+            </p:audio>
+          </p:childTnLst>
+        </p:cTn>
+      </p:par>
+    </p:tnLst>
+  </p:timing>
 </p:sld>
 </file>
 
@@ -17310,7 +17447,7 @@
           <p:nvPr/>
         </p:nvPicPr>
         <p:blipFill>
-          <a:blip r:embed="rId2"/>
+          <a:blip r:embed="rId4"/>
           <a:stretch>
             <a:fillRect/>
           </a:stretch>
@@ -17464,6 +17601,45 @@
           </a:p>
         </p:txBody>
       </p:sp>
+      <p:pic>
+        <p:nvPicPr>
+          <p:cNvPr id="7" name="Audio 6">
+            <a:hlinkClick r:id="" action="ppaction://media"/>
+            <a:extLst>
+              <a:ext uri="{FF2B5EF4-FFF2-40B4-BE49-F238E27FC236}">
+                <a16:creationId xmlns:a16="http://schemas.microsoft.com/office/drawing/2014/main" id="{C5263059-C1CC-E7B6-EFF9-55164A380DA2}"/>
+              </a:ext>
+            </a:extLst>
+          </p:cNvPr>
+          <p:cNvPicPr>
+            <a:picLocks noChangeAspect="1"/>
+          </p:cNvPicPr>
+          <p:nvPr>
+            <a:audioFile r:link="rId2"/>
+            <p:extLst>
+              <p:ext uri="{DAA4B4D4-6D71-4841-9C94-3DE7FCFB9230}">
+                <p14:media xmlns:p14="http://schemas.microsoft.com/office/powerpoint/2010/main" r:embed="rId1"/>
+              </p:ext>
+            </p:extLst>
+          </p:nvPr>
+        </p:nvPicPr>
+        <p:blipFill>
+          <a:blip r:embed="rId5"/>
+          <a:srcRect l="-200000" t="-90625" r="-200000" b="-90625"/>
+          <a:stretch>
+            <a:fillRect/>
+          </a:stretch>
+        </p:blipFill>
+        <p:spPr>
+          <a:xfrm>
+            <a:off x="9144000" y="5143500"/>
+            <a:ext cx="3048000" cy="1714500"/>
+          </a:xfrm>
+          <a:prstGeom prst="rect">
+            <a:avLst/>
+          </a:prstGeom>
+        </p:spPr>
+      </p:pic>
     </p:spTree>
     <p:extLst>
       <p:ext uri="{BB962C8B-B14F-4D97-AF65-F5344CB8AC3E}">
@@ -17474,18 +17650,105 @@
   <p:clrMapOvr>
     <a:masterClrMapping/>
   </p:clrMapOvr>
-  <mc:AlternateContent xmlns:mc="http://schemas.openxmlformats.org/markup-compatibility/2006" xmlns:p14="http://schemas.microsoft.com/office/powerpoint/2010/main">
-    <mc:Choice Requires="p14">
-      <p:transition spd="med" p14:dur="700">
+  <mc:AlternateContent xmlns:mc="http://schemas.openxmlformats.org/markup-compatibility/2006">
+    <mc:Choice xmlns:p14="http://schemas.microsoft.com/office/powerpoint/2010/main" Requires="p14">
+      <p:transition spd="med" p14:dur="700" advTm="30297">
         <p:fade/>
       </p:transition>
     </mc:Choice>
-    <mc:Fallback xmlns="">
-      <p:transition spd="med">
+    <mc:Fallback>
+      <p:transition spd="med" advTm="30297">
         <p:fade/>
       </p:transition>
     </mc:Fallback>
   </mc:AlternateContent>
+  <p:timing>
+    <p:tnLst>
+      <p:par>
+        <p:cTn id="1" dur="indefinite" restart="never" nodeType="tmRoot">
+          <p:childTnLst>
+            <p:seq concurrent="1" nextAc="seek">
+              <p:cTn id="2" dur="indefinite" nodeType="mainSeq">
+                <p:childTnLst>
+                  <p:par>
+                    <p:cTn id="3" fill="hold">
+                      <p:stCondLst>
+                        <p:cond delay="indefinite"/>
+                        <p:cond evt="onBegin" delay="0">
+                          <p:tn val="2"/>
+                        </p:cond>
+                      </p:stCondLst>
+                      <p:childTnLst>
+                        <p:par>
+                          <p:cTn id="4" fill="hold">
+                            <p:stCondLst>
+                              <p:cond delay="0"/>
+                            </p:stCondLst>
+                            <p:childTnLst>
+                              <p:par>
+                                <p:cTn id="5" presetID="1" presetClass="mediacall" presetSubtype="0" fill="hold" nodeType="afterEffect">
+                                  <p:stCondLst>
+                                    <p:cond delay="0"/>
+                                  </p:stCondLst>
+                                  <p:childTnLst>
+                                    <p:cmd type="call" cmd="playFrom(0.0)">
+                                      <p:cBhvr>
+                                        <p:cTn id="6" dur="1" fill="hold"/>
+                                        <p:tgtEl>
+                                          <p:spTgt spid="7"/>
+                                        </p:tgtEl>
+                                      </p:cBhvr>
+                                    </p:cmd>
+                                  </p:childTnLst>
+                                </p:cTn>
+                              </p:par>
+                            </p:childTnLst>
+                          </p:cTn>
+                        </p:par>
+                      </p:childTnLst>
+                    </p:cTn>
+                  </p:par>
+                </p:childTnLst>
+              </p:cTn>
+              <p:prevCondLst>
+                <p:cond evt="onPrev" delay="0">
+                  <p:tgtEl>
+                    <p:sldTgt/>
+                  </p:tgtEl>
+                </p:cond>
+              </p:prevCondLst>
+              <p:nextCondLst>
+                <p:cond evt="onNext" delay="0">
+                  <p:tgtEl>
+                    <p:sldTgt/>
+                  </p:tgtEl>
+                </p:cond>
+              </p:nextCondLst>
+            </p:seq>
+            <p:audio isNarration="1">
+              <p:cMediaNode vol="80000" showWhenStopped="0">
+                <p:cTn id="7" fill="hold" display="0">
+                  <p:stCondLst>
+                    <p:cond delay="indefinite"/>
+                  </p:stCondLst>
+                  <p:endCondLst>
+                    <p:cond evt="onStopAudio" delay="0">
+                      <p:tgtEl>
+                        <p:sldTgt/>
+                      </p:tgtEl>
+                    </p:cond>
+                  </p:endCondLst>
+                </p:cTn>
+                <p:tgtEl>
+                  <p:spTgt spid="7"/>
+                </p:tgtEl>
+              </p:cMediaNode>
+            </p:audio>
+          </p:childTnLst>
+        </p:cTn>
+      </p:par>
+    </p:tnLst>
+  </p:timing>
 </p:sld>
 </file>
 
@@ -17550,7 +17813,7 @@
           <p:nvPr/>
         </p:nvPicPr>
         <p:blipFill>
-          <a:blip r:embed="rId2"/>
+          <a:blip r:embed="rId4"/>
           <a:stretch>
             <a:fillRect/>
           </a:stretch>
@@ -17719,6 +17982,75 @@
           </a:p>
         </p:txBody>
       </p:sp>
+      <p:pic>
+        <p:nvPicPr>
+          <p:cNvPr id="5" name="Picture 4">
+            <a:extLst>
+              <a:ext uri="{FF2B5EF4-FFF2-40B4-BE49-F238E27FC236}">
+                <a16:creationId xmlns:a16="http://schemas.microsoft.com/office/drawing/2014/main" id="{53DFC0F6-2A72-C990-00E6-92B0F56FD5AF}"/>
+              </a:ext>
+            </a:extLst>
+          </p:cNvPr>
+          <p:cNvPicPr>
+            <a:picLocks noChangeAspect="1"/>
+          </p:cNvPicPr>
+          <p:nvPr/>
+        </p:nvPicPr>
+        <p:blipFill>
+          <a:blip r:embed="rId5"/>
+          <a:stretch>
+            <a:fillRect/>
+          </a:stretch>
+        </p:blipFill>
+        <p:spPr>
+          <a:xfrm>
+            <a:off x="3287261" y="2718776"/>
+            <a:ext cx="2481986" cy="2532732"/>
+          </a:xfrm>
+          <a:prstGeom prst="rect">
+            <a:avLst/>
+          </a:prstGeom>
+        </p:spPr>
+      </p:pic>
+      <p:pic>
+        <p:nvPicPr>
+          <p:cNvPr id="8" name="Audio 7">
+            <a:hlinkClick r:id="" action="ppaction://media"/>
+            <a:extLst>
+              <a:ext uri="{FF2B5EF4-FFF2-40B4-BE49-F238E27FC236}">
+                <a16:creationId xmlns:a16="http://schemas.microsoft.com/office/drawing/2014/main" id="{AAD2416E-3D6D-0777-B1BC-B7AA3400E514}"/>
+              </a:ext>
+            </a:extLst>
+          </p:cNvPr>
+          <p:cNvPicPr>
+            <a:picLocks noChangeAspect="1"/>
+          </p:cNvPicPr>
+          <p:nvPr>
+            <a:audioFile r:link="rId2"/>
+            <p:extLst>
+              <p:ext uri="{DAA4B4D4-6D71-4841-9C94-3DE7FCFB9230}">
+                <p14:media xmlns:p14="http://schemas.microsoft.com/office/powerpoint/2010/main" r:embed="rId1"/>
+              </p:ext>
+            </p:extLst>
+          </p:nvPr>
+        </p:nvPicPr>
+        <p:blipFill>
+          <a:blip r:embed="rId6"/>
+          <a:srcRect l="-200000" t="-90625" r="-200000" b="-90625"/>
+          <a:stretch>
+            <a:fillRect/>
+          </a:stretch>
+        </p:blipFill>
+        <p:spPr>
+          <a:xfrm>
+            <a:off x="9144000" y="5143500"/>
+            <a:ext cx="3048000" cy="1714500"/>
+          </a:xfrm>
+          <a:prstGeom prst="rect">
+            <a:avLst/>
+          </a:prstGeom>
+        </p:spPr>
+      </p:pic>
     </p:spTree>
     <p:extLst>
       <p:ext uri="{BB962C8B-B14F-4D97-AF65-F5344CB8AC3E}">
@@ -17729,18 +18061,105 @@
   <p:clrMapOvr>
     <a:masterClrMapping/>
   </p:clrMapOvr>
-  <mc:AlternateContent xmlns:mc="http://schemas.openxmlformats.org/markup-compatibility/2006" xmlns:p14="http://schemas.microsoft.com/office/powerpoint/2010/main">
-    <mc:Choice Requires="p14">
-      <p:transition spd="med" p14:dur="700">
+  <mc:AlternateContent xmlns:mc="http://schemas.openxmlformats.org/markup-compatibility/2006">
+    <mc:Choice xmlns:p14="http://schemas.microsoft.com/office/powerpoint/2010/main" Requires="p14">
+      <p:transition spd="med" p14:dur="700" advTm="19552">
         <p:fade/>
       </p:transition>
     </mc:Choice>
-    <mc:Fallback xmlns="">
-      <p:transition spd="med">
+    <mc:Fallback>
+      <p:transition spd="med" advTm="19552">
         <p:fade/>
       </p:transition>
     </mc:Fallback>
   </mc:AlternateContent>
+  <p:timing>
+    <p:tnLst>
+      <p:par>
+        <p:cTn id="1" dur="indefinite" restart="never" nodeType="tmRoot">
+          <p:childTnLst>
+            <p:seq concurrent="1" nextAc="seek">
+              <p:cTn id="2" dur="indefinite" nodeType="mainSeq">
+                <p:childTnLst>
+                  <p:par>
+                    <p:cTn id="3" fill="hold">
+                      <p:stCondLst>
+                        <p:cond delay="indefinite"/>
+                        <p:cond evt="onBegin" delay="0">
+                          <p:tn val="2"/>
+                        </p:cond>
+                      </p:stCondLst>
+                      <p:childTnLst>
+                        <p:par>
+                          <p:cTn id="4" fill="hold">
+                            <p:stCondLst>
+                              <p:cond delay="0"/>
+                            </p:stCondLst>
+                            <p:childTnLst>
+                              <p:par>
+                                <p:cTn id="5" presetID="1" presetClass="mediacall" presetSubtype="0" fill="hold" nodeType="afterEffect">
+                                  <p:stCondLst>
+                                    <p:cond delay="0"/>
+                                  </p:stCondLst>
+                                  <p:childTnLst>
+                                    <p:cmd type="call" cmd="playFrom(0.0)">
+                                      <p:cBhvr>
+                                        <p:cTn id="6" dur="1" fill="hold"/>
+                                        <p:tgtEl>
+                                          <p:spTgt spid="8"/>
+                                        </p:tgtEl>
+                                      </p:cBhvr>
+                                    </p:cmd>
+                                  </p:childTnLst>
+                                </p:cTn>
+                              </p:par>
+                            </p:childTnLst>
+                          </p:cTn>
+                        </p:par>
+                      </p:childTnLst>
+                    </p:cTn>
+                  </p:par>
+                </p:childTnLst>
+              </p:cTn>
+              <p:prevCondLst>
+                <p:cond evt="onPrev" delay="0">
+                  <p:tgtEl>
+                    <p:sldTgt/>
+                  </p:tgtEl>
+                </p:cond>
+              </p:prevCondLst>
+              <p:nextCondLst>
+                <p:cond evt="onNext" delay="0">
+                  <p:tgtEl>
+                    <p:sldTgt/>
+                  </p:tgtEl>
+                </p:cond>
+              </p:nextCondLst>
+            </p:seq>
+            <p:audio isNarration="1">
+              <p:cMediaNode vol="80000" showWhenStopped="0">
+                <p:cTn id="7" fill="hold" display="0">
+                  <p:stCondLst>
+                    <p:cond delay="indefinite"/>
+                  </p:stCondLst>
+                  <p:endCondLst>
+                    <p:cond evt="onStopAudio" delay="0">
+                      <p:tgtEl>
+                        <p:sldTgt/>
+                      </p:tgtEl>
+                    </p:cond>
+                  </p:endCondLst>
+                </p:cTn>
+                <p:tgtEl>
+                  <p:spTgt spid="8"/>
+                </p:tgtEl>
+              </p:cMediaNode>
+            </p:audio>
+          </p:childTnLst>
+        </p:cTn>
+      </p:par>
+    </p:tnLst>
+  </p:timing>
 </p:sld>
 </file>
 
@@ -17778,7 +18197,7 @@
           <a:p>
             <a:r>
               <a:rPr lang="en-US" dirty="0"/>
-              <a:t>Scanner Controls &amp; Reconstructed Image</a:t>
+              <a:t>Scanner Controls &amp; Image Reconstruction</a:t>
             </a:r>
           </a:p>
         </p:txBody>

</xml_diff>